<commit_message>
Small update to slides text
</commit_message>
<xml_diff>
--- a/ASP.NET Session.pptx
+++ b/ASP.NET Session.pptx
@@ -278,7 +278,7 @@
           <a:p>
             <a:fld id="{433BE584-C8AB-4CF4-82D7-DE32D52B8F80}" type="datetimeFigureOut">
               <a:rPr lang="ru-BY" smtClean="0"/>
-              <a:t>25.09.2018</a:t>
+              <a:t>19.11.2018</a:t>
             </a:fld>
             <a:endParaRPr lang="ru-BY"/>
           </a:p>
@@ -478,7 +478,7 @@
           <a:p>
             <a:fld id="{433BE584-C8AB-4CF4-82D7-DE32D52B8F80}" type="datetimeFigureOut">
               <a:rPr lang="ru-BY" smtClean="0"/>
-              <a:t>25.09.2018</a:t>
+              <a:t>19.11.2018</a:t>
             </a:fld>
             <a:endParaRPr lang="ru-BY"/>
           </a:p>
@@ -688,7 +688,7 @@
           <a:p>
             <a:fld id="{433BE584-C8AB-4CF4-82D7-DE32D52B8F80}" type="datetimeFigureOut">
               <a:rPr lang="ru-BY" smtClean="0"/>
-              <a:t>25.09.2018</a:t>
+              <a:t>19.11.2018</a:t>
             </a:fld>
             <a:endParaRPr lang="ru-BY"/>
           </a:p>
@@ -888,7 +888,7 @@
           <a:p>
             <a:fld id="{433BE584-C8AB-4CF4-82D7-DE32D52B8F80}" type="datetimeFigureOut">
               <a:rPr lang="ru-BY" smtClean="0"/>
-              <a:t>25.09.2018</a:t>
+              <a:t>19.11.2018</a:t>
             </a:fld>
             <a:endParaRPr lang="ru-BY"/>
           </a:p>
@@ -1164,7 +1164,7 @@
           <a:p>
             <a:fld id="{433BE584-C8AB-4CF4-82D7-DE32D52B8F80}" type="datetimeFigureOut">
               <a:rPr lang="ru-BY" smtClean="0"/>
-              <a:t>25.09.2018</a:t>
+              <a:t>19.11.2018</a:t>
             </a:fld>
             <a:endParaRPr lang="ru-BY"/>
           </a:p>
@@ -1432,7 +1432,7 @@
           <a:p>
             <a:fld id="{433BE584-C8AB-4CF4-82D7-DE32D52B8F80}" type="datetimeFigureOut">
               <a:rPr lang="ru-BY" smtClean="0"/>
-              <a:t>25.09.2018</a:t>
+              <a:t>19.11.2018</a:t>
             </a:fld>
             <a:endParaRPr lang="ru-BY"/>
           </a:p>
@@ -1847,7 +1847,7 @@
           <a:p>
             <a:fld id="{433BE584-C8AB-4CF4-82D7-DE32D52B8F80}" type="datetimeFigureOut">
               <a:rPr lang="ru-BY" smtClean="0"/>
-              <a:t>25.09.2018</a:t>
+              <a:t>19.11.2018</a:t>
             </a:fld>
             <a:endParaRPr lang="ru-BY"/>
           </a:p>
@@ -1989,7 +1989,7 @@
           <a:p>
             <a:fld id="{433BE584-C8AB-4CF4-82D7-DE32D52B8F80}" type="datetimeFigureOut">
               <a:rPr lang="ru-BY" smtClean="0"/>
-              <a:t>25.09.2018</a:t>
+              <a:t>19.11.2018</a:t>
             </a:fld>
             <a:endParaRPr lang="ru-BY"/>
           </a:p>
@@ -2102,7 +2102,7 @@
           <a:p>
             <a:fld id="{433BE584-C8AB-4CF4-82D7-DE32D52B8F80}" type="datetimeFigureOut">
               <a:rPr lang="ru-BY" smtClean="0"/>
-              <a:t>25.09.2018</a:t>
+              <a:t>19.11.2018</a:t>
             </a:fld>
             <a:endParaRPr lang="ru-BY"/>
           </a:p>
@@ -2415,7 +2415,7 @@
           <a:p>
             <a:fld id="{433BE584-C8AB-4CF4-82D7-DE32D52B8F80}" type="datetimeFigureOut">
               <a:rPr lang="ru-BY" smtClean="0"/>
-              <a:t>25.09.2018</a:t>
+              <a:t>19.11.2018</a:t>
             </a:fld>
             <a:endParaRPr lang="ru-BY"/>
           </a:p>
@@ -2704,7 +2704,7 @@
           <a:p>
             <a:fld id="{433BE584-C8AB-4CF4-82D7-DE32D52B8F80}" type="datetimeFigureOut">
               <a:rPr lang="ru-BY" smtClean="0"/>
-              <a:t>25.09.2018</a:t>
+              <a:t>19.11.2018</a:t>
             </a:fld>
             <a:endParaRPr lang="ru-BY"/>
           </a:p>
@@ -2947,7 +2947,7 @@
           <a:p>
             <a:fld id="{433BE584-C8AB-4CF4-82D7-DE32D52B8F80}" type="datetimeFigureOut">
               <a:rPr lang="ru-BY" smtClean="0"/>
-              <a:t>25.09.2018</a:t>
+              <a:t>19.11.2018</a:t>
             </a:fld>
             <a:endParaRPr lang="ru-BY"/>
           </a:p>
@@ -3893,8 +3893,13 @@
             </a:r>
             <a:r>
               <a:rPr lang="en-US" sz="2800" dirty="0"/>
-              <a:t> in-memory caches, but they are not practical for web farm due to data duplication</a:t>
-            </a:r>
+              <a:t> in-memory caches, but they are not practical for web farm due to data </a:t>
+            </a:r>
+            <a:r>
+              <a:rPr lang="en-US" sz="2800"/>
+              <a:t>duplication and possible issues with cache invalidation.</a:t>
+            </a:r>
+            <a:endParaRPr lang="en-US" sz="2800" dirty="0"/>
           </a:p>
           <a:p>
             <a:pPr marL="571500" indent="-571500" algn="l">
@@ -4302,12 +4307,12 @@
               <a:t>Use one of the </a:t>
             </a:r>
             <a:r>
-              <a:rPr lang="en-US" sz="2800"/>
-              <a:t>follwoing </a:t>
+              <a:rPr lang="en-US" sz="2800" dirty="0" err="1"/>
+              <a:t>follwoing</a:t>
             </a:r>
             <a:r>
               <a:rPr lang="en-US" sz="2800" dirty="0"/>
-              <a:t>options:</a:t>
+              <a:t> options:</a:t>
             </a:r>
           </a:p>
           <a:p>
@@ -4366,7 +4371,7 @@
             </a:r>
             <a:r>
               <a:rPr lang="en-US" sz="2800" dirty="0"/>
-              <a:t> in more sophisticated applications. Find more about Cross-Page Posting at </a:t>
+              <a:t> in general for more sophisticated applications. Find more about Cross-Page Posting at </a:t>
             </a:r>
             <a:r>
               <a:rPr lang="en-US" sz="2800" dirty="0">
@@ -5660,7 +5665,7 @@
             </a:r>
             <a:r>
               <a:rPr lang="en-US" sz="3600" dirty="0"/>
-              <a:t> – saves session data in dedicated Win Service memory</a:t>
+              <a:t> – saves session data in a dedicated Win Service process memory</a:t>
             </a:r>
           </a:p>
           <a:p>

</xml_diff>